<commit_message>
poster and some code
</commit_message>
<xml_diff>
--- a/598_Poster.pptx
+++ b/598_Poster.pptx
@@ -260,7 +260,7 @@
               <a:pPr>
                 <a:defRPr/>
               </a:pPr>
-              <a:t>12/5/2018</a:t>
+              <a:t>12/5/18</a:t>
             </a:fld>
             <a:endParaRPr lang="en-US"/>
           </a:p>
@@ -837,7 +837,7 @@
               <a:pPr>
                 <a:defRPr/>
               </a:pPr>
-              <a:t>12/5/2018</a:t>
+              <a:t>12/5/18</a:t>
             </a:fld>
             <a:endParaRPr lang="en-US"/>
           </a:p>
@@ -1072,7 +1072,7 @@
               <a:pPr>
                 <a:defRPr/>
               </a:pPr>
-              <a:t>12/5/2018</a:t>
+              <a:t>12/5/18</a:t>
             </a:fld>
             <a:endParaRPr lang="en-US"/>
           </a:p>
@@ -1482,7 +1482,7 @@
               <a:pPr>
                 <a:defRPr/>
               </a:pPr>
-              <a:t>12/5/2018</a:t>
+              <a:t>12/5/18</a:t>
             </a:fld>
             <a:endParaRPr lang="en-US"/>
           </a:p>
@@ -1832,7 +1832,7 @@
               <a:pPr>
                 <a:defRPr/>
               </a:pPr>
-              <a:t>12/5/2018</a:t>
+              <a:t>12/5/18</a:t>
             </a:fld>
             <a:endParaRPr lang="en-US"/>
           </a:p>
@@ -2322,7 +2322,7 @@
               <a:pPr>
                 <a:defRPr/>
               </a:pPr>
-              <a:t>12/5/2018</a:t>
+              <a:t>12/5/18</a:t>
             </a:fld>
             <a:endParaRPr lang="en-US"/>
           </a:p>
@@ -2498,7 +2498,7 @@
               <a:pPr>
                 <a:defRPr/>
               </a:pPr>
-              <a:t>12/5/2018</a:t>
+              <a:t>12/5/18</a:t>
             </a:fld>
             <a:endParaRPr lang="en-US"/>
           </a:p>
@@ -2644,7 +2644,7 @@
               <a:pPr>
                 <a:defRPr/>
               </a:pPr>
-              <a:t>12/5/2018</a:t>
+              <a:t>12/5/18</a:t>
             </a:fld>
             <a:endParaRPr lang="en-US"/>
           </a:p>
@@ -2979,7 +2979,7 @@
               <a:pPr>
                 <a:defRPr/>
               </a:pPr>
-              <a:t>12/5/2018</a:t>
+              <a:t>12/5/18</a:t>
             </a:fld>
             <a:endParaRPr lang="en-US"/>
           </a:p>
@@ -3297,7 +3297,7 @@
               <a:pPr>
                 <a:defRPr/>
               </a:pPr>
-              <a:t>12/5/2018</a:t>
+              <a:t>12/5/18</a:t>
             </a:fld>
             <a:endParaRPr lang="en-US"/>
           </a:p>
@@ -3866,14 +3866,14 @@
           </a:ln>
           <a:extLst>
             <a:ext uri="{909E8E84-426E-40dd-AFC4-6F175D3DCCD1}">
-              <a14:hiddenFill xmlns="" xmlns:a14="http://schemas.microsoft.com/office/drawing/2010/main">
+              <a14:hiddenFill xmlns:a14="http://schemas.microsoft.com/office/drawing/2010/main" xmlns="">
                 <a:solidFill>
                   <a:srgbClr val="FFFFFF"/>
                 </a:solidFill>
               </a14:hiddenFill>
             </a:ext>
             <a:ext uri="{91240B29-F687-4f45-9708-019B960494DF}">
-              <a14:hiddenLine xmlns="" xmlns:a14="http://schemas.microsoft.com/office/drawing/2010/main" w="9525">
+              <a14:hiddenLine xmlns:a14="http://schemas.microsoft.com/office/drawing/2010/main" xmlns="" w="9525">
                 <a:solidFill>
                   <a:srgbClr val="000000"/>
                 </a:solidFill>
@@ -3902,13 +3902,6 @@
               </a:rPr>
               <a:t>Presenter name, Associates and Collaborators</a:t>
             </a:r>
-            <a:r>
-              <a:rPr lang="en-US" sz="4800" b="1">
-                <a:latin typeface="Georgia" charset="0"/>
-                <a:cs typeface="Georgia" charset="0"/>
-              </a:rPr>
-              <a:t/>
-            </a:r>
             <a:br>
               <a:rPr lang="en-US" sz="4800" b="1">
                 <a:latin typeface="Georgia" charset="0"/>
@@ -3947,14 +3940,14 @@
           </a:ln>
           <a:extLst>
             <a:ext uri="{909E8E84-426E-40dd-AFC4-6F175D3DCCD1}">
-              <a14:hiddenFill xmlns="" xmlns:a14="http://schemas.microsoft.com/office/drawing/2010/main">
+              <a14:hiddenFill xmlns:a14="http://schemas.microsoft.com/office/drawing/2010/main" xmlns="">
                 <a:solidFill>
                   <a:srgbClr val="FFFFFF"/>
                 </a:solidFill>
               </a14:hiddenFill>
             </a:ext>
             <a:ext uri="{91240B29-F687-4f45-9708-019B960494DF}">
-              <a14:hiddenLine xmlns="" xmlns:a14="http://schemas.microsoft.com/office/drawing/2010/main" w="9525">
+              <a14:hiddenLine xmlns:a14="http://schemas.microsoft.com/office/drawing/2010/main" xmlns="" w="9525">
                 <a:solidFill>
                   <a:srgbClr val="000000"/>
                 </a:solidFill>
@@ -4157,7 +4150,7 @@
           </a:ln>
           <a:extLst>
             <a:ext uri="{91240B29-F687-4f45-9708-019B960494DF}">
-              <a14:hiddenLine xmlns="" xmlns:a14="http://schemas.microsoft.com/office/drawing/2010/main" w="9525">
+              <a14:hiddenLine xmlns:a14="http://schemas.microsoft.com/office/drawing/2010/main" xmlns="" w="9525">
                 <a:solidFill>
                   <a:srgbClr val="000000"/>
                 </a:solidFill>
@@ -4247,7 +4240,7 @@
           </a:ln>
           <a:extLst>
             <a:ext uri="{91240B29-F687-4f45-9708-019B960494DF}">
-              <a14:hiddenLine xmlns="" xmlns:a14="http://schemas.microsoft.com/office/drawing/2010/main" w="9525">
+              <a14:hiddenLine xmlns:a14="http://schemas.microsoft.com/office/drawing/2010/main" xmlns="" w="9525">
                 <a:solidFill>
                   <a:srgbClr val="000000"/>
                 </a:solidFill>
@@ -4387,7 +4380,7 @@
           </a:ln>
           <a:extLst>
             <a:ext uri="{91240B29-F687-4f45-9708-019B960494DF}">
-              <a14:hiddenLine xmlns="" xmlns:a14="http://schemas.microsoft.com/office/drawing/2010/main" w="9525">
+              <a14:hiddenLine xmlns:a14="http://schemas.microsoft.com/office/drawing/2010/main" xmlns="" w="9525">
                 <a:solidFill>
                   <a:srgbClr val="000000"/>
                 </a:solidFill>
@@ -4593,7 +4586,7 @@
           </a:ln>
           <a:extLst>
             <a:ext uri="{91240B29-F687-4f45-9708-019B960494DF}">
-              <a14:hiddenLine xmlns="" xmlns:a14="http://schemas.microsoft.com/office/drawing/2010/main" w="9525">
+              <a14:hiddenLine xmlns:a14="http://schemas.microsoft.com/office/drawing/2010/main" xmlns="" w="9525">
                 <a:solidFill>
                   <a:srgbClr val="000000"/>
                 </a:solidFill>
@@ -4787,7 +4780,7 @@
           </a:ln>
           <a:extLst>
             <a:ext uri="{91240B29-F687-4f45-9708-019B960494DF}">
-              <a14:hiddenLine xmlns="" xmlns:a14="http://schemas.microsoft.com/office/drawing/2010/main" w="9525">
+              <a14:hiddenLine xmlns:a14="http://schemas.microsoft.com/office/drawing/2010/main" xmlns="" w="9525">
                 <a:solidFill>
                   <a:srgbClr val="000000"/>
                 </a:solidFill>
@@ -4997,7 +4990,7 @@
           </a:ln>
           <a:extLst>
             <a:ext uri="{91240B29-F687-4f45-9708-019B960494DF}">
-              <a14:hiddenLine xmlns="" xmlns:a14="http://schemas.microsoft.com/office/drawing/2010/main" w="9525">
+              <a14:hiddenLine xmlns:a14="http://schemas.microsoft.com/office/drawing/2010/main" xmlns="" w="9525">
                 <a:solidFill>
                   <a:srgbClr val="000000"/>
                 </a:solidFill>
@@ -5109,7 +5102,7 @@
           </a:ln>
           <a:extLst>
             <a:ext uri="{91240B29-F687-4f45-9708-019B960494DF}">
-              <a14:hiddenLine xmlns="" xmlns:a14="http://schemas.microsoft.com/office/drawing/2010/main" w="9525">
+              <a14:hiddenLine xmlns:a14="http://schemas.microsoft.com/office/drawing/2010/main" xmlns="" w="9525">
                 <a:solidFill>
                   <a:srgbClr val="000000"/>
                 </a:solidFill>
@@ -5229,14 +5222,14 @@
           </a:ln>
           <a:extLst>
             <a:ext uri="{909E8E84-426E-40dd-AFC4-6F175D3DCCD1}">
-              <a14:hiddenFill xmlns="" xmlns:a14="http://schemas.microsoft.com/office/drawing/2010/main">
+              <a14:hiddenFill xmlns:a14="http://schemas.microsoft.com/office/drawing/2010/main" xmlns="">
                 <a:solidFill>
                   <a:srgbClr val="FFFFFF"/>
                 </a:solidFill>
               </a14:hiddenFill>
             </a:ext>
             <a:ext uri="{91240B29-F687-4f45-9708-019B960494DF}">
-              <a14:hiddenLine xmlns="" xmlns:a14="http://schemas.microsoft.com/office/drawing/2010/main" w="9525">
+              <a14:hiddenLine xmlns:a14="http://schemas.microsoft.com/office/drawing/2010/main" xmlns="" w="9525">
                 <a:solidFill>
                   <a:srgbClr val="000000"/>
                 </a:solidFill>
@@ -5438,14 +5431,14 @@
           </a:ln>
           <a:extLst>
             <a:ext uri="{909E8E84-426E-40dd-AFC4-6F175D3DCCD1}">
-              <a14:hiddenFill xmlns="" xmlns:a14="http://schemas.microsoft.com/office/drawing/2010/main">
+              <a14:hiddenFill xmlns:a14="http://schemas.microsoft.com/office/drawing/2010/main" xmlns="">
                 <a:solidFill>
                   <a:srgbClr val="FFFFFF"/>
                 </a:solidFill>
               </a14:hiddenFill>
             </a:ext>
             <a:ext uri="{91240B29-F687-4f45-9708-019B960494DF}">
-              <a14:hiddenLine xmlns="" xmlns:a14="http://schemas.microsoft.com/office/drawing/2010/main" w="9525">
+              <a14:hiddenLine xmlns:a14="http://schemas.microsoft.com/office/drawing/2010/main" xmlns="" w="9525">
                 <a:solidFill>
                   <a:srgbClr val="000000"/>
                 </a:solidFill>
@@ -5611,14 +5604,14 @@
           </a:ln>
           <a:extLst>
             <a:ext uri="{909E8E84-426E-40dd-AFC4-6F175D3DCCD1}">
-              <a14:hiddenFill xmlns="" xmlns:a14="http://schemas.microsoft.com/office/drawing/2010/main">
+              <a14:hiddenFill xmlns:a14="http://schemas.microsoft.com/office/drawing/2010/main" xmlns="">
                 <a:solidFill>
                   <a:srgbClr val="FFFFFF"/>
                 </a:solidFill>
               </a14:hiddenFill>
             </a:ext>
             <a:ext uri="{91240B29-F687-4f45-9708-019B960494DF}">
-              <a14:hiddenLine xmlns="" xmlns:a14="http://schemas.microsoft.com/office/drawing/2010/main" w="9525">
+              <a14:hiddenLine xmlns:a14="http://schemas.microsoft.com/office/drawing/2010/main" xmlns="" w="9525">
                 <a:solidFill>
                   <a:srgbClr val="000000"/>
                 </a:solidFill>
@@ -5856,14 +5849,14 @@
           </a:ln>
           <a:extLst>
             <a:ext uri="{909E8E84-426E-40dd-AFC4-6F175D3DCCD1}">
-              <a14:hiddenFill xmlns="" xmlns:a14="http://schemas.microsoft.com/office/drawing/2010/main">
+              <a14:hiddenFill xmlns:a14="http://schemas.microsoft.com/office/drawing/2010/main" xmlns="">
                 <a:solidFill>
                   <a:srgbClr val="FFFFFF"/>
                 </a:solidFill>
               </a14:hiddenFill>
             </a:ext>
             <a:ext uri="{91240B29-F687-4f45-9708-019B960494DF}">
-              <a14:hiddenLine xmlns="" xmlns:a14="http://schemas.microsoft.com/office/drawing/2010/main" w="9525">
+              <a14:hiddenLine xmlns:a14="http://schemas.microsoft.com/office/drawing/2010/main" xmlns="" w="9525">
                 <a:solidFill>
                   <a:srgbClr val="000000"/>
                 </a:solidFill>
@@ -6065,14 +6058,14 @@
           </a:ln>
           <a:extLst>
             <a:ext uri="{909E8E84-426E-40dd-AFC4-6F175D3DCCD1}">
-              <a14:hiddenFill xmlns="" xmlns:a14="http://schemas.microsoft.com/office/drawing/2010/main">
+              <a14:hiddenFill xmlns:a14="http://schemas.microsoft.com/office/drawing/2010/main" xmlns="">
                 <a:solidFill>
                   <a:srgbClr val="FFFFFF"/>
                 </a:solidFill>
               </a14:hiddenFill>
             </a:ext>
             <a:ext uri="{91240B29-F687-4f45-9708-019B960494DF}">
-              <a14:hiddenLine xmlns="" xmlns:a14="http://schemas.microsoft.com/office/drawing/2010/main" w="9525">
+              <a14:hiddenLine xmlns:a14="http://schemas.microsoft.com/office/drawing/2010/main" xmlns="" w="9525">
                 <a:solidFill>
                   <a:srgbClr val="000000"/>
                 </a:solidFill>
@@ -6274,14 +6267,14 @@
           </a:ln>
           <a:extLst>
             <a:ext uri="{909E8E84-426E-40dd-AFC4-6F175D3DCCD1}">
-              <a14:hiddenFill xmlns="" xmlns:a14="http://schemas.microsoft.com/office/drawing/2010/main">
+              <a14:hiddenFill xmlns:a14="http://schemas.microsoft.com/office/drawing/2010/main" xmlns="">
                 <a:solidFill>
                   <a:srgbClr val="FFFFFF"/>
                 </a:solidFill>
               </a14:hiddenFill>
             </a:ext>
             <a:ext uri="{91240B29-F687-4f45-9708-019B960494DF}">
-              <a14:hiddenLine xmlns="" xmlns:a14="http://schemas.microsoft.com/office/drawing/2010/main" w="9525">
+              <a14:hiddenLine xmlns:a14="http://schemas.microsoft.com/office/drawing/2010/main" xmlns="" w="9525">
                 <a:solidFill>
                   <a:srgbClr val="000000"/>
                 </a:solidFill>
@@ -6502,14 +6495,14 @@
           </a:ln>
           <a:extLst>
             <a:ext uri="{909E8E84-426E-40dd-AFC4-6F175D3DCCD1}">
-              <a14:hiddenFill xmlns="" xmlns:a14="http://schemas.microsoft.com/office/drawing/2010/main">
+              <a14:hiddenFill xmlns:a14="http://schemas.microsoft.com/office/drawing/2010/main" xmlns="">
                 <a:solidFill>
                   <a:srgbClr val="FFFFFF"/>
                 </a:solidFill>
               </a14:hiddenFill>
             </a:ext>
             <a:ext uri="{91240B29-F687-4f45-9708-019B960494DF}">
-              <a14:hiddenLine xmlns="" xmlns:a14="http://schemas.microsoft.com/office/drawing/2010/main" w="9525">
+              <a14:hiddenLine xmlns:a14="http://schemas.microsoft.com/office/drawing/2010/main" xmlns="" w="9525">
                 <a:solidFill>
                   <a:srgbClr val="000000"/>
                 </a:solidFill>
@@ -6541,16 +6534,6 @@
               </a:rPr>
               <a:t>Hakan Tekgul, Raimi Shah</a:t>
             </a:r>
-            <a:r>
-              <a:rPr lang="en-US" sz="4800" b="1" dirty="0">
-                <a:solidFill>
-                  <a:schemeClr val="tx2"/>
-                </a:solidFill>
-                <a:latin typeface="Georgia" charset="0"/>
-                <a:cs typeface="Georgia" charset="0"/>
-              </a:rPr>
-              <a:t/>
-            </a:r>
             <a:br>
               <a:rPr lang="en-US" sz="4800" b="1" dirty="0">
                 <a:solidFill>
@@ -6595,14 +6578,14 @@
           </a:ln>
           <a:extLst>
             <a:ext uri="{909E8E84-426E-40dd-AFC4-6F175D3DCCD1}">
-              <a14:hiddenFill xmlns="" xmlns:a14="http://schemas.microsoft.com/office/drawing/2010/main">
+              <a14:hiddenFill xmlns:a14="http://schemas.microsoft.com/office/drawing/2010/main" xmlns="">
                 <a:solidFill>
                   <a:srgbClr val="FFFFFF"/>
                 </a:solidFill>
               </a14:hiddenFill>
             </a:ext>
             <a:ext uri="{91240B29-F687-4f45-9708-019B960494DF}">
-              <a14:hiddenLine xmlns="" xmlns:a14="http://schemas.microsoft.com/office/drawing/2010/main" w="9525">
+              <a14:hiddenLine xmlns:a14="http://schemas.microsoft.com/office/drawing/2010/main" xmlns="" w="9525">
                 <a:solidFill>
                   <a:srgbClr val="000000"/>
                 </a:solidFill>
@@ -6760,7 +6743,7 @@
           </a:ln>
           <a:extLst>
             <a:ext uri="{91240B29-F687-4f45-9708-019B960494DF}">
-              <a14:hiddenLine xmlns="" xmlns:a14="http://schemas.microsoft.com/office/drawing/2010/main" w="9525">
+              <a14:hiddenLine xmlns:a14="http://schemas.microsoft.com/office/drawing/2010/main" xmlns="" w="9525">
                 <a:solidFill>
                   <a:srgbClr val="000000"/>
                 </a:solidFill>
@@ -6850,7 +6833,7 @@
           </a:ln>
           <a:extLst>
             <a:ext uri="{91240B29-F687-4f45-9708-019B960494DF}">
-              <a14:hiddenLine xmlns="" xmlns:a14="http://schemas.microsoft.com/office/drawing/2010/main" w="9525">
+              <a14:hiddenLine xmlns:a14="http://schemas.microsoft.com/office/drawing/2010/main" xmlns="" w="9525">
                 <a:solidFill>
                   <a:srgbClr val="000000"/>
                 </a:solidFill>
@@ -6897,49 +6880,7 @@
                 <a:latin typeface="Georgia" charset="0"/>
                 <a:cs typeface="Georgia" charset="0"/>
               </a:rPr>
-              <a:t> is an open source software framework for Music Information </a:t>
-            </a:r>
-            <a:r>
-              <a:rPr lang="en-US" sz="2800" dirty="0" smtClean="0">
-                <a:latin typeface="Georgia" charset="0"/>
-                <a:cs typeface="Georgia" charset="0"/>
-              </a:rPr>
-              <a:t>Retrieval with </a:t>
-            </a:r>
-            <a:r>
-              <a:rPr lang="en-US" sz="2800" dirty="0" smtClean="0">
-                <a:latin typeface="Georgia" charset="0"/>
-                <a:cs typeface="Georgia" charset="0"/>
-              </a:rPr>
-              <a:t>the </a:t>
-            </a:r>
-            <a:r>
-              <a:rPr lang="en-US" sz="2800" dirty="0" smtClean="0">
-                <a:latin typeface="Georgia" charset="0"/>
-                <a:cs typeface="Georgia" charset="0"/>
-              </a:rPr>
-              <a:t>GTZAN </a:t>
-            </a:r>
-            <a:r>
-              <a:rPr lang="en-US" sz="2800" dirty="0">
-                <a:latin typeface="Georgia" charset="0"/>
-                <a:cs typeface="Georgia" charset="0"/>
-              </a:rPr>
-              <a:t>Genre Collection Database, which has 10 genres and each genre has 100 30-second audio tracks. All the tracks are 22050 Hz Mono 16-bit audio files in .au format. For this project, we chose five distinct genres; classical, metal, blues, pop,  </a:t>
-            </a:r>
-            <a:r>
-              <a:rPr lang="en-US" sz="2800" dirty="0" smtClean="0">
-                <a:latin typeface="Georgia" charset="0"/>
-                <a:cs typeface="Georgia" charset="0"/>
-              </a:rPr>
-              <a:t>country. </a:t>
-            </a:r>
-            <a:r>
-              <a:rPr lang="en-US" sz="2800" dirty="0">
-                <a:latin typeface="Georgia" charset="0"/>
-                <a:cs typeface="Georgia" charset="0"/>
-              </a:rPr>
-              <a:t>Hence, our dataset was 500 songs total, from which we used 80% for training and 20% for testing. </a:t>
+              <a:t> is an open source software framework for Music Information Retrieval with the GTZAN Genre Collection Database, which has 10 genres and each genre has 100 30-second audio tracks. All the tracks are 22050 Hz Mono 16-bit audio files in .au format. For this project, we chose five distinct genres; classical, metal, blues, pop,  country. Hence, our dataset was 500 songs total, from which we used 80% for training and 20% for testing. </a:t>
             </a:r>
           </a:p>
           <a:p>
@@ -6970,35 +6911,7 @@
                 <a:latin typeface="Georgia" charset="0"/>
                 <a:cs typeface="Georgia" charset="0"/>
               </a:rPr>
-              <a:t>-spectrogram of each song. After that, we mapped the frequencies to cepstral coefficients and performed a Discrete Cosine </a:t>
-            </a:r>
-            <a:r>
-              <a:rPr lang="en-US" sz="2800" dirty="0" smtClean="0">
-                <a:latin typeface="Georgia" charset="0"/>
-                <a:cs typeface="Georgia" charset="0"/>
-              </a:rPr>
-              <a:t>Transform and </a:t>
-            </a:r>
-            <a:r>
-              <a:rPr lang="en-US" sz="2800" dirty="0">
-                <a:latin typeface="Georgia" charset="0"/>
-                <a:cs typeface="Georgia" charset="0"/>
-              </a:rPr>
-              <a:t>used PCA to </a:t>
-            </a:r>
-            <a:r>
-              <a:rPr lang="en-US" sz="2800" dirty="0" smtClean="0">
-                <a:latin typeface="Georgia" charset="0"/>
-                <a:cs typeface="Georgia" charset="0"/>
-              </a:rPr>
-              <a:t>for dimensionality reduction, </a:t>
-            </a:r>
-            <a:r>
-              <a:rPr lang="en-US" sz="2800" dirty="0">
-                <a:latin typeface="Georgia" charset="0"/>
-                <a:cs typeface="Georgia" charset="0"/>
-              </a:rPr>
-              <a:t>which produced significant results.</a:t>
+              <a:t>-spectrogram of each song. After that, we mapped the frequencies to cepstral coefficients and performed a Discrete Cosine Transform and used PCA to for dimensionality reduction, which produced significant results.</a:t>
             </a:r>
           </a:p>
           <a:p>
@@ -7050,7 +6963,7 @@
           </a:ln>
           <a:extLst>
             <a:ext uri="{91240B29-F687-4f45-9708-019B960494DF}">
-              <a14:hiddenLine xmlns="" xmlns:a14="http://schemas.microsoft.com/office/drawing/2010/main" w="9525">
+              <a14:hiddenLine xmlns:a14="http://schemas.microsoft.com/office/drawing/2010/main" xmlns="" w="9525">
                 <a:solidFill>
                   <a:srgbClr val="000000"/>
                 </a:solidFill>
@@ -7181,7 +7094,7 @@
                   </a:spcBef>
                 </a:pPr>
                 <a:r>
-                  <a:rPr lang="en-GB" sz="4000" b="1" u="sng" dirty="0" smtClean="0">
+                  <a:rPr lang="en-GB" sz="4000" b="1" u="sng" dirty="0">
                     <a:solidFill>
                       <a:srgbClr val="131F33"/>
                     </a:solidFill>
@@ -7216,9 +7129,6 @@
                   </a:rPr>
                   <a:t>	We used the simple, but effective k-NN algorithm for genre classification. After our experiments, we found out that k = 8 was the best hyperparameter. We used Euclidean distance to compute the distance between two data points. </a:t>
                 </a:r>
-                <a:endParaRPr lang="en-US" sz="2800" dirty="0" smtClean="0">
-                  <a:latin typeface="Georgia" charset="0"/>
-                </a:endParaRPr>
               </a:p>
               <a:p>
                 <a:pPr marL="381000" indent="-381000" algn="just"/>
@@ -7259,10 +7169,6 @@
                   </a:rPr>
                   <a:t>K-Means Clustering: </a:t>
                 </a:r>
-                <a:endParaRPr lang="en-US" sz="2800" b="1" dirty="0" smtClean="0">
-                  <a:latin typeface="Georgia" charset="0"/>
-                  <a:cs typeface="Georgia" charset="0"/>
-                </a:endParaRPr>
               </a:p>
               <a:p>
                 <a:pPr marL="381000" indent="-381000"/>
@@ -7274,21 +7180,21 @@
                   <a:t>	</a:t>
                 </a:r>
                 <a:r>
-                  <a:rPr lang="en-US" sz="2800" dirty="0" smtClean="0">
+                  <a:rPr lang="en-US" sz="2800" dirty="0">
                     <a:latin typeface="Georgia" charset="0"/>
                     <a:cs typeface="Georgia" charset="0"/>
                   </a:rPr>
                   <a:t>We experimented using </a:t>
                 </a:r>
                 <a:r>
-                  <a:rPr lang="en-US" sz="2800" dirty="0" err="1" smtClean="0">
+                  <a:rPr lang="en-US" sz="2800" dirty="0" err="1">
                     <a:latin typeface="Georgia" charset="0"/>
                     <a:cs typeface="Georgia" charset="0"/>
                   </a:rPr>
                   <a:t>KMeans</a:t>
                 </a:r>
                 <a:r>
-                  <a:rPr lang="en-US" sz="2800" dirty="0" smtClean="0">
+                  <a:rPr lang="en-US" sz="2800" dirty="0">
                     <a:latin typeface="Georgia" charset="0"/>
                     <a:cs typeface="Georgia" charset="0"/>
                   </a:rPr>
@@ -7518,14 +7424,7 @@
                     <a:latin typeface="Georgia" charset="0"/>
                     <a:cs typeface="Georgia" charset="0"/>
                   </a:rPr>
-                  <a:t>Gaussian Mixture Model</a:t>
-                </a:r>
-                <a:r>
-                  <a:rPr lang="en-US" sz="2800" b="1" dirty="0" smtClean="0">
-                    <a:latin typeface="Georgia" charset="0"/>
-                    <a:cs typeface="Georgia" charset="0"/>
-                  </a:rPr>
-                  <a:t>:</a:t>
+                  <a:t>Gaussian Mixture Model:</a:t>
                 </a:r>
               </a:p>
               <a:p>
@@ -7538,7 +7437,7 @@
                   <a:t>	</a:t>
                 </a:r>
                 <a:r>
-                  <a:rPr lang="en-US" sz="2800" dirty="0" smtClean="0">
+                  <a:rPr lang="en-US" sz="2800" dirty="0">
                     <a:latin typeface="Georgia" charset="0"/>
                     <a:cs typeface="Georgia" charset="0"/>
                   </a:rPr>
@@ -7554,10 +7453,6 @@
                   </a:rPr>
                   <a:t>	</a:t>
                 </a:r>
-                <a:endParaRPr lang="en-US" sz="2800" b="1" dirty="0">
-                  <a:latin typeface="Georgia" charset="0"/>
-                  <a:cs typeface="Georgia" charset="0"/>
-                </a:endParaRPr>
               </a:p>
               <a:p>
                 <a:pPr marL="381000" indent="-381000"/>
@@ -7569,25 +7464,18 @@
               <a:p>
                 <a:pPr marL="381000" indent="-381000"/>
                 <a:r>
-                  <a:rPr lang="en-US" sz="2800" b="1" dirty="0" smtClean="0">
+                  <a:rPr lang="en-US" sz="2800" b="1">
                     <a:latin typeface="Georgia" charset="0"/>
                     <a:cs typeface="Georgia" charset="0"/>
                   </a:rPr>
-                  <a:t>Simple 2-layer </a:t>
+                  <a:t>Simple 3-layer </a:t>
                 </a:r>
                 <a:r>
                   <a:rPr lang="en-US" sz="2800" b="1" dirty="0">
                     <a:latin typeface="Georgia" charset="0"/>
                     <a:cs typeface="Georgia" charset="0"/>
                   </a:rPr>
-                  <a:t>Neural Network</a:t>
-                </a:r>
-                <a:r>
-                  <a:rPr lang="en-US" sz="2800" b="1" dirty="0" smtClean="0">
-                    <a:latin typeface="Georgia" charset="0"/>
-                    <a:cs typeface="Georgia" charset="0"/>
-                  </a:rPr>
-                  <a:t>:</a:t>
+                  <a:t>Neural Network:</a:t>
                 </a:r>
               </a:p>
               <a:p>
@@ -7600,27 +7488,27 @@
                   <a:t>	</a:t>
                 </a:r>
                 <a:r>
-                  <a:rPr lang="en-US" sz="2800" dirty="0" smtClean="0">
+                  <a:rPr lang="en-US" sz="2800" dirty="0">
                     <a:latin typeface="Georgia" charset="0"/>
                     <a:cs typeface="Georgia" charset="0"/>
                   </a:rPr>
                   <a:t>We then decided it would be best to utilize a couple of deep learning methods. To being, we created a simple 2 layer neural network with </a:t>
                 </a:r>
                 <a:r>
-                  <a:rPr lang="en-US" sz="2800" dirty="0" err="1" smtClean="0">
+                  <a:rPr lang="en-US" sz="2800" dirty="0" err="1">
                     <a:latin typeface="Georgia" charset="0"/>
                     <a:cs typeface="Georgia" charset="0"/>
                   </a:rPr>
                   <a:t>ReLU</a:t>
                 </a:r>
                 <a:r>
-                  <a:rPr lang="en-US" sz="2800" dirty="0" smtClean="0">
+                  <a:rPr lang="en-US" sz="2800" dirty="0">
                     <a:latin typeface="Georgia" charset="0"/>
                     <a:cs typeface="Georgia" charset="0"/>
                   </a:rPr>
                   <a:t> nonlinearity.</a:t>
                 </a:r>
-                <a:endParaRPr lang="en-US" sz="2800" b="1" dirty="0" smtClean="0">
+                <a:endParaRPr lang="en-US" sz="2800" b="1" dirty="0">
                   <a:latin typeface="Georgia" charset="0"/>
                   <a:cs typeface="Georgia" charset="0"/>
                 </a:endParaRPr>
@@ -7628,16 +7516,12 @@
               <a:p>
                 <a:pPr marL="381000" indent="-381000"/>
                 <a:r>
-                  <a:rPr lang="en-US" sz="2800" b="1" dirty="0" smtClean="0">
+                  <a:rPr lang="en-US" sz="2800" b="1" dirty="0">
                     <a:latin typeface="Georgia" charset="0"/>
                     <a:cs typeface="Georgia" charset="0"/>
                   </a:rPr>
                   <a:t> </a:t>
                 </a:r>
-                <a:endParaRPr lang="en-US" sz="2800" b="1" dirty="0">
-                  <a:latin typeface="Georgia" charset="0"/>
-                  <a:cs typeface="Georgia" charset="0"/>
-                </a:endParaRPr>
               </a:p>
               <a:p>
                 <a:pPr marL="381000" indent="-381000"/>
@@ -7663,19 +7547,8 @@
                     <a:latin typeface="Georgia" charset="0"/>
                     <a:cs typeface="Georgia" charset="0"/>
                   </a:rPr>
-                  <a:t>	</a:t>
+                  <a:t>	To finish out our experiments, we tried a couple of different convolutional neural network architectures.</a:t>
                 </a:r>
-                <a:r>
-                  <a:rPr lang="en-US" sz="2800" dirty="0" smtClean="0">
-                    <a:latin typeface="Georgia" charset="0"/>
-                    <a:cs typeface="Georgia" charset="0"/>
-                  </a:rPr>
-                  <a:t>To finish out our experiments, we tried a couple of different convolutional neural network architectures.</a:t>
-                </a:r>
-                <a:endParaRPr lang="en-US" sz="2800" dirty="0">
-                  <a:latin typeface="Georgia" charset="0"/>
-                  <a:cs typeface="Georgia" charset="0"/>
-                </a:endParaRPr>
               </a:p>
             </p:txBody>
           </p:sp>
@@ -7697,7 +7570,7 @@
               <a:prstGeom prst="rect">
                 <a:avLst/>
               </a:prstGeom>
-              <a:blipFill rotWithShape="0">
+              <a:blipFill>
                 <a:blip r:embed="rId2"/>
                 <a:stretch>
                   <a:fillRect/>
@@ -7724,7 +7597,7 @@
               <a:lstStyle/>
               <a:p>
                 <a:r>
-                  <a:rPr lang="en-US">
+                  <a:rPr lang="tr-TR">
                     <a:noFill/>
                   </a:rPr>
                   <a:t> </a:t>
@@ -7758,7 +7631,7 @@
           </a:ln>
           <a:extLst>
             <a:ext uri="{91240B29-F687-4f45-9708-019B960494DF}">
-              <a14:hiddenLine xmlns="" xmlns:a14="http://schemas.microsoft.com/office/drawing/2010/main" w="9525">
+              <a14:hiddenLine xmlns:a14="http://schemas.microsoft.com/office/drawing/2010/main" xmlns="" w="9525">
                 <a:solidFill>
                   <a:srgbClr val="000000"/>
                 </a:solidFill>
@@ -7800,10 +7673,6 @@
               </a:rPr>
               <a:t> </a:t>
             </a:r>
-            <a:endParaRPr lang="en-US" sz="2800" dirty="0" smtClean="0">
-              <a:latin typeface="Georgia" charset="0"/>
-              <a:cs typeface="Georgia" charset="0"/>
-            </a:endParaRPr>
           </a:p>
           <a:p>
             <a:endParaRPr lang="en-US" sz="2800" dirty="0">
@@ -7855,7 +7724,7 @@
           </a:ln>
           <a:extLst>
             <a:ext uri="{91240B29-F687-4f45-9708-019B960494DF}">
-              <a14:hiddenLine xmlns="" xmlns:a14="http://schemas.microsoft.com/office/drawing/2010/main" w="9525">
+              <a14:hiddenLine xmlns:a14="http://schemas.microsoft.com/office/drawing/2010/main" xmlns="" w="9525">
                 <a:solidFill>
                   <a:srgbClr val="000000"/>
                 </a:solidFill>
@@ -7966,7 +7835,7 @@
           </a:ln>
           <a:extLst>
             <a:ext uri="{91240B29-F687-4f45-9708-019B960494DF}">
-              <a14:hiddenLine xmlns="" xmlns:a14="http://schemas.microsoft.com/office/drawing/2010/main" w="9525">
+              <a14:hiddenLine xmlns:a14="http://schemas.microsoft.com/office/drawing/2010/main" xmlns="" w="9525">
                 <a:solidFill>
                   <a:srgbClr val="000000"/>
                 </a:solidFill>
@@ -8021,633 +7890,6 @@
               </a:rPr>
               <a:t>creativeservices@illinois.edu</a:t>
             </a:r>
-          </a:p>
-        </p:txBody>
-      </p:sp>
-      <p:sp>
-        <p:nvSpPr>
-          <p:cNvPr id="15371" name="Rectangle 13"/>
-          <p:cNvSpPr>
-            <a:spLocks noChangeArrowheads="1"/>
-          </p:cNvSpPr>
-          <p:nvPr/>
-        </p:nvSpPr>
-        <p:spPr bwMode="auto">
-          <a:xfrm>
-            <a:off x="22783800" y="26276300"/>
-            <a:ext cx="8915400" cy="3598863"/>
-          </a:xfrm>
-          <a:prstGeom prst="rect">
-            <a:avLst/>
-          </a:prstGeom>
-          <a:solidFill>
-            <a:srgbClr val="EEEEEE"/>
-          </a:solidFill>
-          <a:ln w="9525">
-            <a:solidFill>
-              <a:schemeClr val="tx1"/>
-            </a:solidFill>
-            <a:miter lim="800000"/>
-            <a:headEnd/>
-            <a:tailEnd/>
-          </a:ln>
-        </p:spPr>
-        <p:txBody>
-          <a:bodyPr wrap="none" anchor="ctr"/>
-          <a:lstStyle/>
-          <a:p>
-            <a:endParaRPr lang="en-US"/>
-          </a:p>
-        </p:txBody>
-      </p:sp>
-      <p:sp>
-        <p:nvSpPr>
-          <p:cNvPr id="15372" name="Text Box 14"/>
-          <p:cNvSpPr txBox="1">
-            <a:spLocks noChangeArrowheads="1"/>
-          </p:cNvSpPr>
-          <p:nvPr/>
-        </p:nvSpPr>
-        <p:spPr bwMode="auto">
-          <a:xfrm>
-            <a:off x="22783800" y="29994225"/>
-            <a:ext cx="8915400" cy="1323975"/>
-          </a:xfrm>
-          <a:prstGeom prst="rect">
-            <a:avLst/>
-          </a:prstGeom>
-          <a:noFill/>
-          <a:ln>
-            <a:noFill/>
-          </a:ln>
-          <a:extLst>
-            <a:ext uri="{909E8E84-426E-40dd-AFC4-6F175D3DCCD1}">
-              <a14:hiddenFill xmlns="" xmlns:a14="http://schemas.microsoft.com/office/drawing/2010/main">
-                <a:solidFill>
-                  <a:srgbClr val="FFFFFF"/>
-                </a:solidFill>
-              </a14:hiddenFill>
-            </a:ext>
-            <a:ext uri="{91240B29-F687-4f45-9708-019B960494DF}">
-              <a14:hiddenLine xmlns="" xmlns:a14="http://schemas.microsoft.com/office/drawing/2010/main" w="9525">
-                <a:solidFill>
-                  <a:srgbClr val="000000"/>
-                </a:solidFill>
-                <a:miter lim="800000"/>
-                <a:headEnd/>
-                <a:tailEnd/>
-              </a14:hiddenLine>
-            </a:ext>
-          </a:extLst>
-        </p:spPr>
-        <p:txBody>
-          <a:bodyPr lIns="0" rIns="0">
-            <a:spAutoFit/>
-          </a:bodyPr>
-          <a:lstStyle>
-            <a:lvl1pPr eaLnBrk="0" hangingPunct="0">
-              <a:defRPr sz="8600">
-                <a:solidFill>
-                  <a:schemeClr val="tx1"/>
-                </a:solidFill>
-                <a:latin typeface="Arial" charset="0"/>
-                <a:ea typeface="ＭＳ Ｐゴシック" charset="0"/>
-                <a:cs typeface="ＭＳ Ｐゴシック" charset="0"/>
-              </a:defRPr>
-            </a:lvl1pPr>
-            <a:lvl2pPr marL="742950" indent="-285750" eaLnBrk="0" hangingPunct="0">
-              <a:defRPr sz="8600">
-                <a:solidFill>
-                  <a:schemeClr val="tx1"/>
-                </a:solidFill>
-                <a:latin typeface="Arial" charset="0"/>
-                <a:ea typeface="ＭＳ Ｐゴシック" charset="0"/>
-              </a:defRPr>
-            </a:lvl2pPr>
-            <a:lvl3pPr marL="1143000" indent="-228600" eaLnBrk="0" hangingPunct="0">
-              <a:defRPr sz="8600">
-                <a:solidFill>
-                  <a:schemeClr val="tx1"/>
-                </a:solidFill>
-                <a:latin typeface="Arial" charset="0"/>
-                <a:ea typeface="ＭＳ Ｐゴシック" charset="0"/>
-              </a:defRPr>
-            </a:lvl3pPr>
-            <a:lvl4pPr marL="1600200" indent="-228600" eaLnBrk="0" hangingPunct="0">
-              <a:defRPr sz="8600">
-                <a:solidFill>
-                  <a:schemeClr val="tx1"/>
-                </a:solidFill>
-                <a:latin typeface="Arial" charset="0"/>
-                <a:ea typeface="ＭＳ Ｐゴシック" charset="0"/>
-              </a:defRPr>
-            </a:lvl4pPr>
-            <a:lvl5pPr marL="2057400" indent="-228600" eaLnBrk="0" hangingPunct="0">
-              <a:defRPr sz="8600">
-                <a:solidFill>
-                  <a:schemeClr val="tx1"/>
-                </a:solidFill>
-                <a:latin typeface="Arial" charset="0"/>
-                <a:ea typeface="ＭＳ Ｐゴシック" charset="0"/>
-              </a:defRPr>
-            </a:lvl5pPr>
-            <a:lvl6pPr marL="2514600" indent="-228600" defTabSz="2193925" eaLnBrk="0" fontAlgn="base" hangingPunct="0">
-              <a:spcBef>
-                <a:spcPct val="0"/>
-              </a:spcBef>
-              <a:spcAft>
-                <a:spcPct val="0"/>
-              </a:spcAft>
-              <a:defRPr sz="8600">
-                <a:solidFill>
-                  <a:schemeClr val="tx1"/>
-                </a:solidFill>
-                <a:latin typeface="Arial" charset="0"/>
-                <a:ea typeface="ＭＳ Ｐゴシック" charset="0"/>
-              </a:defRPr>
-            </a:lvl6pPr>
-            <a:lvl7pPr marL="2971800" indent="-228600" defTabSz="2193925" eaLnBrk="0" fontAlgn="base" hangingPunct="0">
-              <a:spcBef>
-                <a:spcPct val="0"/>
-              </a:spcBef>
-              <a:spcAft>
-                <a:spcPct val="0"/>
-              </a:spcAft>
-              <a:defRPr sz="8600">
-                <a:solidFill>
-                  <a:schemeClr val="tx1"/>
-                </a:solidFill>
-                <a:latin typeface="Arial" charset="0"/>
-                <a:ea typeface="ＭＳ Ｐゴシック" charset="0"/>
-              </a:defRPr>
-            </a:lvl7pPr>
-            <a:lvl8pPr marL="3429000" indent="-228600" defTabSz="2193925" eaLnBrk="0" fontAlgn="base" hangingPunct="0">
-              <a:spcBef>
-                <a:spcPct val="0"/>
-              </a:spcBef>
-              <a:spcAft>
-                <a:spcPct val="0"/>
-              </a:spcAft>
-              <a:defRPr sz="8600">
-                <a:solidFill>
-                  <a:schemeClr val="tx1"/>
-                </a:solidFill>
-                <a:latin typeface="Arial" charset="0"/>
-                <a:ea typeface="ＭＳ Ｐゴシック" charset="0"/>
-              </a:defRPr>
-            </a:lvl8pPr>
-            <a:lvl9pPr marL="3886200" indent="-228600" defTabSz="2193925" eaLnBrk="0" fontAlgn="base" hangingPunct="0">
-              <a:spcBef>
-                <a:spcPct val="0"/>
-              </a:spcBef>
-              <a:spcAft>
-                <a:spcPct val="0"/>
-              </a:spcAft>
-              <a:defRPr sz="8600">
-                <a:solidFill>
-                  <a:schemeClr val="tx1"/>
-                </a:solidFill>
-                <a:latin typeface="Arial" charset="0"/>
-                <a:ea typeface="ＭＳ Ｐゴシック" charset="0"/>
-              </a:defRPr>
-            </a:lvl9pPr>
-          </a:lstStyle>
-          <a:p>
-            <a:pPr eaLnBrk="1" hangingPunct="1"/>
-            <a:r>
-              <a:rPr lang="en-AU" sz="2000" i="1"/>
-              <a:t>Captions set in a serif style font such as Times, 18 to 24 size, italic style. </a:t>
-            </a:r>
-          </a:p>
-          <a:p>
-            <a:pPr eaLnBrk="1" hangingPunct="1"/>
-            <a:endParaRPr lang="en-AU" sz="2000" i="1"/>
-          </a:p>
-          <a:p>
-            <a:pPr eaLnBrk="1" hangingPunct="1"/>
-            <a:r>
-              <a:rPr lang="en-US" sz="2000" i="1"/>
-              <a:t>Duis autem vel eum iriure dolor in hendrerit in vulputate velit esse molestie consequat.</a:t>
-            </a:r>
-            <a:endParaRPr lang="en-AU" sz="2000" i="1"/>
-          </a:p>
-        </p:txBody>
-      </p:sp>
-      <p:sp>
-        <p:nvSpPr>
-          <p:cNvPr id="15373" name="Rectangle 15"/>
-          <p:cNvSpPr>
-            <a:spLocks noChangeArrowheads="1"/>
-          </p:cNvSpPr>
-          <p:nvPr/>
-        </p:nvSpPr>
-        <p:spPr bwMode="auto">
-          <a:xfrm>
-            <a:off x="22783800" y="21996400"/>
-            <a:ext cx="5399088" cy="3598863"/>
-          </a:xfrm>
-          <a:prstGeom prst="rect">
-            <a:avLst/>
-          </a:prstGeom>
-          <a:solidFill>
-            <a:srgbClr val="EEEEEE"/>
-          </a:solidFill>
-          <a:ln w="9525">
-            <a:solidFill>
-              <a:schemeClr val="tx1"/>
-            </a:solidFill>
-            <a:miter lim="800000"/>
-            <a:headEnd/>
-            <a:tailEnd/>
-          </a:ln>
-        </p:spPr>
-        <p:txBody>
-          <a:bodyPr wrap="none" anchor="ctr"/>
-          <a:lstStyle/>
-          <a:p>
-            <a:endParaRPr lang="en-US"/>
-          </a:p>
-        </p:txBody>
-      </p:sp>
-      <p:sp>
-        <p:nvSpPr>
-          <p:cNvPr id="15374" name="Text Box 16"/>
-          <p:cNvSpPr txBox="1">
-            <a:spLocks noChangeArrowheads="1"/>
-          </p:cNvSpPr>
-          <p:nvPr/>
-        </p:nvSpPr>
-        <p:spPr bwMode="auto">
-          <a:xfrm>
-            <a:off x="28194000" y="21790025"/>
-            <a:ext cx="3505200" cy="2825750"/>
-          </a:xfrm>
-          <a:prstGeom prst="rect">
-            <a:avLst/>
-          </a:prstGeom>
-          <a:noFill/>
-          <a:ln>
-            <a:noFill/>
-          </a:ln>
-          <a:extLst>
-            <a:ext uri="{909E8E84-426E-40dd-AFC4-6F175D3DCCD1}">
-              <a14:hiddenFill xmlns="" xmlns:a14="http://schemas.microsoft.com/office/drawing/2010/main">
-                <a:solidFill>
-                  <a:srgbClr val="FFFFFF"/>
-                </a:solidFill>
-              </a14:hiddenFill>
-            </a:ext>
-            <a:ext uri="{91240B29-F687-4f45-9708-019B960494DF}">
-              <a14:hiddenLine xmlns="" xmlns:a14="http://schemas.microsoft.com/office/drawing/2010/main" w="9525">
-                <a:solidFill>
-                  <a:srgbClr val="000000"/>
-                </a:solidFill>
-                <a:miter lim="800000"/>
-                <a:headEnd/>
-                <a:tailEnd/>
-              </a14:hiddenLine>
-            </a:ext>
-          </a:extLst>
-        </p:spPr>
-        <p:txBody>
-          <a:bodyPr lIns="180000" tIns="180000" rIns="180000" bIns="180000">
-            <a:spAutoFit/>
-          </a:bodyPr>
-          <a:lstStyle>
-            <a:lvl1pPr eaLnBrk="0" hangingPunct="0">
-              <a:defRPr sz="8600">
-                <a:solidFill>
-                  <a:schemeClr val="tx1"/>
-                </a:solidFill>
-                <a:latin typeface="Arial" charset="0"/>
-                <a:ea typeface="ＭＳ Ｐゴシック" charset="0"/>
-                <a:cs typeface="ＭＳ Ｐゴシック" charset="0"/>
-              </a:defRPr>
-            </a:lvl1pPr>
-            <a:lvl2pPr marL="742950" indent="-285750" eaLnBrk="0" hangingPunct="0">
-              <a:defRPr sz="8600">
-                <a:solidFill>
-                  <a:schemeClr val="tx1"/>
-                </a:solidFill>
-                <a:latin typeface="Arial" charset="0"/>
-                <a:ea typeface="ＭＳ Ｐゴシック" charset="0"/>
-              </a:defRPr>
-            </a:lvl2pPr>
-            <a:lvl3pPr marL="1143000" indent="-228600" eaLnBrk="0" hangingPunct="0">
-              <a:defRPr sz="8600">
-                <a:solidFill>
-                  <a:schemeClr val="tx1"/>
-                </a:solidFill>
-                <a:latin typeface="Arial" charset="0"/>
-                <a:ea typeface="ＭＳ Ｐゴシック" charset="0"/>
-              </a:defRPr>
-            </a:lvl3pPr>
-            <a:lvl4pPr marL="1600200" indent="-228600" eaLnBrk="0" hangingPunct="0">
-              <a:defRPr sz="8600">
-                <a:solidFill>
-                  <a:schemeClr val="tx1"/>
-                </a:solidFill>
-                <a:latin typeface="Arial" charset="0"/>
-                <a:ea typeface="ＭＳ Ｐゴシック" charset="0"/>
-              </a:defRPr>
-            </a:lvl4pPr>
-            <a:lvl5pPr marL="2057400" indent="-228600" eaLnBrk="0" hangingPunct="0">
-              <a:defRPr sz="8600">
-                <a:solidFill>
-                  <a:schemeClr val="tx1"/>
-                </a:solidFill>
-                <a:latin typeface="Arial" charset="0"/>
-                <a:ea typeface="ＭＳ Ｐゴシック" charset="0"/>
-              </a:defRPr>
-            </a:lvl5pPr>
-            <a:lvl6pPr marL="2514600" indent="-228600" defTabSz="2193925" eaLnBrk="0" fontAlgn="base" hangingPunct="0">
-              <a:spcBef>
-                <a:spcPct val="0"/>
-              </a:spcBef>
-              <a:spcAft>
-                <a:spcPct val="0"/>
-              </a:spcAft>
-              <a:defRPr sz="8600">
-                <a:solidFill>
-                  <a:schemeClr val="tx1"/>
-                </a:solidFill>
-                <a:latin typeface="Arial" charset="0"/>
-                <a:ea typeface="ＭＳ Ｐゴシック" charset="0"/>
-              </a:defRPr>
-            </a:lvl6pPr>
-            <a:lvl7pPr marL="2971800" indent="-228600" defTabSz="2193925" eaLnBrk="0" fontAlgn="base" hangingPunct="0">
-              <a:spcBef>
-                <a:spcPct val="0"/>
-              </a:spcBef>
-              <a:spcAft>
-                <a:spcPct val="0"/>
-              </a:spcAft>
-              <a:defRPr sz="8600">
-                <a:solidFill>
-                  <a:schemeClr val="tx1"/>
-                </a:solidFill>
-                <a:latin typeface="Arial" charset="0"/>
-                <a:ea typeface="ＭＳ Ｐゴシック" charset="0"/>
-              </a:defRPr>
-            </a:lvl7pPr>
-            <a:lvl8pPr marL="3429000" indent="-228600" defTabSz="2193925" eaLnBrk="0" fontAlgn="base" hangingPunct="0">
-              <a:spcBef>
-                <a:spcPct val="0"/>
-              </a:spcBef>
-              <a:spcAft>
-                <a:spcPct val="0"/>
-              </a:spcAft>
-              <a:defRPr sz="8600">
-                <a:solidFill>
-                  <a:schemeClr val="tx1"/>
-                </a:solidFill>
-                <a:latin typeface="Arial" charset="0"/>
-                <a:ea typeface="ＭＳ Ｐゴシック" charset="0"/>
-              </a:defRPr>
-            </a:lvl8pPr>
-            <a:lvl9pPr marL="3886200" indent="-228600" defTabSz="2193925" eaLnBrk="0" fontAlgn="base" hangingPunct="0">
-              <a:spcBef>
-                <a:spcPct val="0"/>
-              </a:spcBef>
-              <a:spcAft>
-                <a:spcPct val="0"/>
-              </a:spcAft>
-              <a:defRPr sz="8600">
-                <a:solidFill>
-                  <a:schemeClr val="tx1"/>
-                </a:solidFill>
-                <a:latin typeface="Arial" charset="0"/>
-                <a:ea typeface="ＭＳ Ｐゴシック" charset="0"/>
-              </a:defRPr>
-            </a:lvl9pPr>
-          </a:lstStyle>
-          <a:p>
-            <a:pPr eaLnBrk="1" hangingPunct="1"/>
-            <a:r>
-              <a:rPr lang="en-AU" sz="2000" i="1"/>
-              <a:t>Captions set in a serif style font such as Times, 18 to 24 size, italic style. </a:t>
-            </a:r>
-          </a:p>
-          <a:p>
-            <a:pPr eaLnBrk="1" hangingPunct="1"/>
-            <a:endParaRPr lang="en-AU" sz="2000" i="1"/>
-          </a:p>
-          <a:p>
-            <a:pPr eaLnBrk="1" hangingPunct="1"/>
-            <a:r>
-              <a:rPr lang="en-US" sz="2000" i="1"/>
-              <a:t>Duis autem vel eum iriure dolor in hendrerit in vulputate velit esse molestie consequat.</a:t>
-            </a:r>
-            <a:endParaRPr lang="en-AU" sz="2000" i="1"/>
-          </a:p>
-        </p:txBody>
-      </p:sp>
-      <p:sp>
-        <p:nvSpPr>
-          <p:cNvPr id="15381" name="Rectangle 21"/>
-          <p:cNvSpPr>
-            <a:spLocks noChangeArrowheads="1"/>
-          </p:cNvSpPr>
-          <p:nvPr/>
-        </p:nvSpPr>
-        <p:spPr bwMode="auto">
-          <a:xfrm>
-            <a:off x="22794913" y="17724438"/>
-            <a:ext cx="5399087" cy="3598862"/>
-          </a:xfrm>
-          <a:prstGeom prst="rect">
-            <a:avLst/>
-          </a:prstGeom>
-          <a:solidFill>
-            <a:srgbClr val="EEEEEE"/>
-          </a:solidFill>
-          <a:ln w="9525">
-            <a:solidFill>
-              <a:schemeClr val="tx1"/>
-            </a:solidFill>
-            <a:miter lim="800000"/>
-            <a:headEnd/>
-            <a:tailEnd/>
-          </a:ln>
-        </p:spPr>
-        <p:txBody>
-          <a:bodyPr wrap="none" anchor="ctr"/>
-          <a:lstStyle/>
-          <a:p>
-            <a:endParaRPr lang="en-US"/>
-          </a:p>
-        </p:txBody>
-      </p:sp>
-      <p:sp>
-        <p:nvSpPr>
-          <p:cNvPr id="15382" name="Text Box 22"/>
-          <p:cNvSpPr txBox="1">
-            <a:spLocks noChangeArrowheads="1"/>
-          </p:cNvSpPr>
-          <p:nvPr/>
-        </p:nvSpPr>
-        <p:spPr bwMode="auto">
-          <a:xfrm>
-            <a:off x="28205113" y="17518063"/>
-            <a:ext cx="3505200" cy="2825750"/>
-          </a:xfrm>
-          <a:prstGeom prst="rect">
-            <a:avLst/>
-          </a:prstGeom>
-          <a:noFill/>
-          <a:ln>
-            <a:noFill/>
-          </a:ln>
-          <a:extLst>
-            <a:ext uri="{909E8E84-426E-40dd-AFC4-6F175D3DCCD1}">
-              <a14:hiddenFill xmlns="" xmlns:a14="http://schemas.microsoft.com/office/drawing/2010/main">
-                <a:solidFill>
-                  <a:srgbClr val="FFFFFF"/>
-                </a:solidFill>
-              </a14:hiddenFill>
-            </a:ext>
-            <a:ext uri="{91240B29-F687-4f45-9708-019B960494DF}">
-              <a14:hiddenLine xmlns="" xmlns:a14="http://schemas.microsoft.com/office/drawing/2010/main" w="9525">
-                <a:solidFill>
-                  <a:srgbClr val="000000"/>
-                </a:solidFill>
-                <a:miter lim="800000"/>
-                <a:headEnd/>
-                <a:tailEnd/>
-              </a14:hiddenLine>
-            </a:ext>
-          </a:extLst>
-        </p:spPr>
-        <p:txBody>
-          <a:bodyPr lIns="180000" tIns="180000" rIns="180000" bIns="180000">
-            <a:spAutoFit/>
-          </a:bodyPr>
-          <a:lstStyle>
-            <a:lvl1pPr eaLnBrk="0" hangingPunct="0">
-              <a:defRPr sz="8600">
-                <a:solidFill>
-                  <a:schemeClr val="tx1"/>
-                </a:solidFill>
-                <a:latin typeface="Arial" charset="0"/>
-                <a:ea typeface="ＭＳ Ｐゴシック" charset="0"/>
-                <a:cs typeface="ＭＳ Ｐゴシック" charset="0"/>
-              </a:defRPr>
-            </a:lvl1pPr>
-            <a:lvl2pPr marL="742950" indent="-285750" eaLnBrk="0" hangingPunct="0">
-              <a:defRPr sz="8600">
-                <a:solidFill>
-                  <a:schemeClr val="tx1"/>
-                </a:solidFill>
-                <a:latin typeface="Arial" charset="0"/>
-                <a:ea typeface="ＭＳ Ｐゴシック" charset="0"/>
-              </a:defRPr>
-            </a:lvl2pPr>
-            <a:lvl3pPr marL="1143000" indent="-228600" eaLnBrk="0" hangingPunct="0">
-              <a:defRPr sz="8600">
-                <a:solidFill>
-                  <a:schemeClr val="tx1"/>
-                </a:solidFill>
-                <a:latin typeface="Arial" charset="0"/>
-                <a:ea typeface="ＭＳ Ｐゴシック" charset="0"/>
-              </a:defRPr>
-            </a:lvl3pPr>
-            <a:lvl4pPr marL="1600200" indent="-228600" eaLnBrk="0" hangingPunct="0">
-              <a:defRPr sz="8600">
-                <a:solidFill>
-                  <a:schemeClr val="tx1"/>
-                </a:solidFill>
-                <a:latin typeface="Arial" charset="0"/>
-                <a:ea typeface="ＭＳ Ｐゴシック" charset="0"/>
-              </a:defRPr>
-            </a:lvl4pPr>
-            <a:lvl5pPr marL="2057400" indent="-228600" eaLnBrk="0" hangingPunct="0">
-              <a:defRPr sz="8600">
-                <a:solidFill>
-                  <a:schemeClr val="tx1"/>
-                </a:solidFill>
-                <a:latin typeface="Arial" charset="0"/>
-                <a:ea typeface="ＭＳ Ｐゴシック" charset="0"/>
-              </a:defRPr>
-            </a:lvl5pPr>
-            <a:lvl6pPr marL="2514600" indent="-228600" defTabSz="2193925" eaLnBrk="0" fontAlgn="base" hangingPunct="0">
-              <a:spcBef>
-                <a:spcPct val="0"/>
-              </a:spcBef>
-              <a:spcAft>
-                <a:spcPct val="0"/>
-              </a:spcAft>
-              <a:defRPr sz="8600">
-                <a:solidFill>
-                  <a:schemeClr val="tx1"/>
-                </a:solidFill>
-                <a:latin typeface="Arial" charset="0"/>
-                <a:ea typeface="ＭＳ Ｐゴシック" charset="0"/>
-              </a:defRPr>
-            </a:lvl6pPr>
-            <a:lvl7pPr marL="2971800" indent="-228600" defTabSz="2193925" eaLnBrk="0" fontAlgn="base" hangingPunct="0">
-              <a:spcBef>
-                <a:spcPct val="0"/>
-              </a:spcBef>
-              <a:spcAft>
-                <a:spcPct val="0"/>
-              </a:spcAft>
-              <a:defRPr sz="8600">
-                <a:solidFill>
-                  <a:schemeClr val="tx1"/>
-                </a:solidFill>
-                <a:latin typeface="Arial" charset="0"/>
-                <a:ea typeface="ＭＳ Ｐゴシック" charset="0"/>
-              </a:defRPr>
-            </a:lvl7pPr>
-            <a:lvl8pPr marL="3429000" indent="-228600" defTabSz="2193925" eaLnBrk="0" fontAlgn="base" hangingPunct="0">
-              <a:spcBef>
-                <a:spcPct val="0"/>
-              </a:spcBef>
-              <a:spcAft>
-                <a:spcPct val="0"/>
-              </a:spcAft>
-              <a:defRPr sz="8600">
-                <a:solidFill>
-                  <a:schemeClr val="tx1"/>
-                </a:solidFill>
-                <a:latin typeface="Arial" charset="0"/>
-                <a:ea typeface="ＭＳ Ｐゴシック" charset="0"/>
-              </a:defRPr>
-            </a:lvl8pPr>
-            <a:lvl9pPr marL="3886200" indent="-228600" defTabSz="2193925" eaLnBrk="0" fontAlgn="base" hangingPunct="0">
-              <a:spcBef>
-                <a:spcPct val="0"/>
-              </a:spcBef>
-              <a:spcAft>
-                <a:spcPct val="0"/>
-              </a:spcAft>
-              <a:defRPr sz="8600">
-                <a:solidFill>
-                  <a:schemeClr val="tx1"/>
-                </a:solidFill>
-                <a:latin typeface="Arial" charset="0"/>
-                <a:ea typeface="ＭＳ Ｐゴシック" charset="0"/>
-              </a:defRPr>
-            </a:lvl9pPr>
-          </a:lstStyle>
-          <a:p>
-            <a:pPr eaLnBrk="1" hangingPunct="1"/>
-            <a:r>
-              <a:rPr lang="en-AU" sz="2000" i="1"/>
-              <a:t>Captions set in a serif style font such as Times, 18 to 24 size, italic style. </a:t>
-            </a:r>
-          </a:p>
-          <a:p>
-            <a:pPr eaLnBrk="1" hangingPunct="1"/>
-            <a:endParaRPr lang="en-AU" sz="2000" i="1"/>
-          </a:p>
-          <a:p>
-            <a:pPr eaLnBrk="1" hangingPunct="1"/>
-            <a:r>
-              <a:rPr lang="en-US" sz="2000" i="1"/>
-              <a:t>Duis autem vel eum iriure dolor in hendrerit in vulputate velit esse molestie consequat.</a:t>
-            </a:r>
-            <a:endParaRPr lang="en-AU" sz="2000" i="1"/>
           </a:p>
         </p:txBody>
       </p:sp>
@@ -8697,8 +7939,8 @@
         </p:blipFill>
         <p:spPr>
           <a:xfrm>
-            <a:off x="22421850" y="7008813"/>
-            <a:ext cx="5506096" cy="4121795"/>
+            <a:off x="27113029" y="6282510"/>
+            <a:ext cx="5043371" cy="3775405"/>
           </a:xfrm>
           <a:prstGeom prst="rect">
             <a:avLst/>
@@ -8713,8 +7955,8 @@
         </p:nvSpPr>
         <p:spPr>
           <a:xfrm>
-            <a:off x="29165550" y="7184202"/>
-            <a:ext cx="2285106" cy="1384995"/>
+            <a:off x="27091175" y="10234474"/>
+            <a:ext cx="5093418" cy="523220"/>
           </a:xfrm>
           <a:prstGeom prst="rect">
             <a:avLst/>
@@ -8728,10 +7970,334 @@
           <a:lstStyle/>
           <a:p>
             <a:r>
-              <a:rPr lang="en-US" sz="2800" dirty="0" smtClean="0"/>
+              <a:rPr lang="en-US" sz="2800" dirty="0"/>
               <a:t>Data reduced to 3 dimensions</a:t>
             </a:r>
-            <a:endParaRPr lang="en-US" sz="2800" dirty="0"/>
+          </a:p>
+        </p:txBody>
+      </p:sp>
+      <p:pic>
+        <p:nvPicPr>
+          <p:cNvPr id="6" name="Picture 5">
+            <a:extLst>
+              <a:ext uri="{FF2B5EF4-FFF2-40B4-BE49-F238E27FC236}">
+                <a16:creationId xmlns:a16="http://schemas.microsoft.com/office/drawing/2014/main" id="{FF1009FD-E928-DD4A-AFCB-B2FDEBC325D6}"/>
+              </a:ext>
+            </a:extLst>
+          </p:cNvPr>
+          <p:cNvPicPr>
+            <a:picLocks noChangeAspect="1"/>
+          </p:cNvPicPr>
+          <p:nvPr/>
+        </p:nvPicPr>
+        <p:blipFill>
+          <a:blip r:embed="rId6"/>
+          <a:stretch>
+            <a:fillRect/>
+          </a:stretch>
+        </p:blipFill>
+        <p:spPr>
+          <a:xfrm>
+            <a:off x="22421850" y="11096594"/>
+            <a:ext cx="4927784" cy="4075672"/>
+          </a:xfrm>
+          <a:prstGeom prst="rect">
+            <a:avLst/>
+          </a:prstGeom>
+        </p:spPr>
+      </p:pic>
+      <p:sp>
+        <p:nvSpPr>
+          <p:cNvPr id="22" name="TextBox 21">
+            <a:extLst>
+              <a:ext uri="{FF2B5EF4-FFF2-40B4-BE49-F238E27FC236}">
+                <a16:creationId xmlns:a16="http://schemas.microsoft.com/office/drawing/2014/main" id="{8059BE91-239C-C944-9904-6A5963AAF874}"/>
+              </a:ext>
+            </a:extLst>
+          </p:cNvPr>
+          <p:cNvSpPr txBox="1"/>
+          <p:nvPr/>
+        </p:nvSpPr>
+        <p:spPr>
+          <a:xfrm>
+            <a:off x="23874499" y="15163934"/>
+            <a:ext cx="2285106" cy="523220"/>
+          </a:xfrm>
+          <a:prstGeom prst="rect">
+            <a:avLst/>
+          </a:prstGeom>
+          <a:noFill/>
+        </p:spPr>
+        <p:txBody>
+          <a:bodyPr wrap="square" rtlCol="0">
+            <a:spAutoFit/>
+          </a:bodyPr>
+          <a:lstStyle/>
+          <a:p>
+            <a:r>
+              <a:rPr lang="en-US" sz="2800" dirty="0"/>
+              <a:t>k-NN 81%</a:t>
+            </a:r>
+          </a:p>
+        </p:txBody>
+      </p:sp>
+      <p:pic>
+        <p:nvPicPr>
+          <p:cNvPr id="8" name="Picture 7">
+            <a:extLst>
+              <a:ext uri="{FF2B5EF4-FFF2-40B4-BE49-F238E27FC236}">
+                <a16:creationId xmlns:a16="http://schemas.microsoft.com/office/drawing/2014/main" id="{F53EEA8C-CB4B-7846-8FD1-C945C28EC753}"/>
+              </a:ext>
+            </a:extLst>
+          </p:cNvPr>
+          <p:cNvPicPr>
+            <a:picLocks noChangeAspect="1"/>
+          </p:cNvPicPr>
+          <p:nvPr/>
+        </p:nvPicPr>
+        <p:blipFill>
+          <a:blip r:embed="rId7"/>
+          <a:stretch>
+            <a:fillRect/>
+          </a:stretch>
+        </p:blipFill>
+        <p:spPr>
+          <a:xfrm>
+            <a:off x="27275675" y="11085270"/>
+            <a:ext cx="4880725" cy="4076745"/>
+          </a:xfrm>
+          <a:prstGeom prst="rect">
+            <a:avLst/>
+          </a:prstGeom>
+        </p:spPr>
+      </p:pic>
+      <p:sp>
+        <p:nvSpPr>
+          <p:cNvPr id="25" name="TextBox 24">
+            <a:extLst>
+              <a:ext uri="{FF2B5EF4-FFF2-40B4-BE49-F238E27FC236}">
+                <a16:creationId xmlns:a16="http://schemas.microsoft.com/office/drawing/2014/main" id="{CEE1A563-FA37-9143-9886-7511BBD88EFF}"/>
+              </a:ext>
+            </a:extLst>
+          </p:cNvPr>
+          <p:cNvSpPr txBox="1"/>
+          <p:nvPr/>
+        </p:nvSpPr>
+        <p:spPr>
+          <a:xfrm>
+            <a:off x="29102598" y="15179198"/>
+            <a:ext cx="2285106" cy="523220"/>
+          </a:xfrm>
+          <a:prstGeom prst="rect">
+            <a:avLst/>
+          </a:prstGeom>
+          <a:noFill/>
+        </p:spPr>
+        <p:txBody>
+          <a:bodyPr wrap="square" rtlCol="0">
+            <a:spAutoFit/>
+          </a:bodyPr>
+          <a:lstStyle/>
+          <a:p>
+            <a:r>
+              <a:rPr lang="en-US" sz="2800" dirty="0"/>
+              <a:t>SVM 84%</a:t>
+            </a:r>
+          </a:p>
+        </p:txBody>
+      </p:sp>
+      <p:pic>
+        <p:nvPicPr>
+          <p:cNvPr id="10" name="Picture 9">
+            <a:extLst>
+              <a:ext uri="{FF2B5EF4-FFF2-40B4-BE49-F238E27FC236}">
+                <a16:creationId xmlns:a16="http://schemas.microsoft.com/office/drawing/2014/main" id="{B4621072-E207-4E41-A58F-FEC4F97B2819}"/>
+              </a:ext>
+            </a:extLst>
+          </p:cNvPr>
+          <p:cNvPicPr>
+            <a:picLocks noChangeAspect="1"/>
+          </p:cNvPicPr>
+          <p:nvPr/>
+        </p:nvPicPr>
+        <p:blipFill>
+          <a:blip r:embed="rId8"/>
+          <a:stretch>
+            <a:fillRect/>
+          </a:stretch>
+        </p:blipFill>
+        <p:spPr>
+          <a:xfrm>
+            <a:off x="27349634" y="15665525"/>
+            <a:ext cx="4711314" cy="4079982"/>
+          </a:xfrm>
+          <a:prstGeom prst="rect">
+            <a:avLst/>
+          </a:prstGeom>
+        </p:spPr>
+      </p:pic>
+      <p:sp>
+        <p:nvSpPr>
+          <p:cNvPr id="28" name="TextBox 27">
+            <a:extLst>
+              <a:ext uri="{FF2B5EF4-FFF2-40B4-BE49-F238E27FC236}">
+                <a16:creationId xmlns:a16="http://schemas.microsoft.com/office/drawing/2014/main" id="{DFD90288-D91C-864E-AFE3-9B4CDAB7DAC8}"/>
+              </a:ext>
+            </a:extLst>
+          </p:cNvPr>
+          <p:cNvSpPr txBox="1"/>
+          <p:nvPr/>
+        </p:nvSpPr>
+        <p:spPr>
+          <a:xfrm>
+            <a:off x="23874499" y="19898380"/>
+            <a:ext cx="2610880" cy="523220"/>
+          </a:xfrm>
+          <a:prstGeom prst="rect">
+            <a:avLst/>
+          </a:prstGeom>
+          <a:noFill/>
+        </p:spPr>
+        <p:txBody>
+          <a:bodyPr wrap="square" rtlCol="0">
+            <a:spAutoFit/>
+          </a:bodyPr>
+          <a:lstStyle/>
+          <a:p>
+            <a:r>
+              <a:rPr lang="en-US" sz="2800" dirty="0"/>
+              <a:t>Gaussian 85%</a:t>
+            </a:r>
+          </a:p>
+        </p:txBody>
+      </p:sp>
+      <p:pic>
+        <p:nvPicPr>
+          <p:cNvPr id="12" name="Picture 11">
+            <a:extLst>
+              <a:ext uri="{FF2B5EF4-FFF2-40B4-BE49-F238E27FC236}">
+                <a16:creationId xmlns:a16="http://schemas.microsoft.com/office/drawing/2014/main" id="{37B458A6-CF92-1146-A24B-A209DE5C2A30}"/>
+              </a:ext>
+            </a:extLst>
+          </p:cNvPr>
+          <p:cNvPicPr>
+            <a:picLocks noChangeAspect="1"/>
+          </p:cNvPicPr>
+          <p:nvPr/>
+        </p:nvPicPr>
+        <p:blipFill>
+          <a:blip r:embed="rId9"/>
+          <a:stretch>
+            <a:fillRect/>
+          </a:stretch>
+        </p:blipFill>
+        <p:spPr>
+          <a:xfrm>
+            <a:off x="22367262" y="6297234"/>
+            <a:ext cx="4924092" cy="3713518"/>
+          </a:xfrm>
+          <a:prstGeom prst="rect">
+            <a:avLst/>
+          </a:prstGeom>
+        </p:spPr>
+      </p:pic>
+      <p:sp>
+        <p:nvSpPr>
+          <p:cNvPr id="31" name="TextBox 30">
+            <a:extLst>
+              <a:ext uri="{FF2B5EF4-FFF2-40B4-BE49-F238E27FC236}">
+                <a16:creationId xmlns:a16="http://schemas.microsoft.com/office/drawing/2014/main" id="{1C1BC384-0934-C248-99E0-C3CC457072CB}"/>
+              </a:ext>
+            </a:extLst>
+          </p:cNvPr>
+          <p:cNvSpPr txBox="1"/>
+          <p:nvPr/>
+        </p:nvSpPr>
+        <p:spPr>
+          <a:xfrm>
+            <a:off x="22298407" y="10230308"/>
+            <a:ext cx="5093418" cy="523220"/>
+          </a:xfrm>
+          <a:prstGeom prst="rect">
+            <a:avLst/>
+          </a:prstGeom>
+          <a:noFill/>
+        </p:spPr>
+        <p:txBody>
+          <a:bodyPr wrap="square" rtlCol="0">
+            <a:spAutoFit/>
+          </a:bodyPr>
+          <a:lstStyle/>
+          <a:p>
+            <a:r>
+              <a:rPr lang="en-US" sz="2800" dirty="0"/>
+              <a:t>Data reduced to 2 dimensions</a:t>
+            </a:r>
+          </a:p>
+        </p:txBody>
+      </p:sp>
+      <p:pic>
+        <p:nvPicPr>
+          <p:cNvPr id="14" name="Picture 13">
+            <a:extLst>
+              <a:ext uri="{FF2B5EF4-FFF2-40B4-BE49-F238E27FC236}">
+                <a16:creationId xmlns:a16="http://schemas.microsoft.com/office/drawing/2014/main" id="{D025AAA8-75A6-0C40-AD3C-C4E8D450015B}"/>
+              </a:ext>
+            </a:extLst>
+          </p:cNvPr>
+          <p:cNvPicPr>
+            <a:picLocks noChangeAspect="1"/>
+          </p:cNvPicPr>
+          <p:nvPr/>
+        </p:nvPicPr>
+        <p:blipFill>
+          <a:blip r:embed="rId10"/>
+          <a:stretch>
+            <a:fillRect/>
+          </a:stretch>
+        </p:blipFill>
+        <p:spPr>
+          <a:xfrm>
+            <a:off x="22518685" y="15687154"/>
+            <a:ext cx="4572490" cy="3972446"/>
+          </a:xfrm>
+          <a:prstGeom prst="rect">
+            <a:avLst/>
+          </a:prstGeom>
+        </p:spPr>
+      </p:pic>
+      <p:sp>
+        <p:nvSpPr>
+          <p:cNvPr id="34" name="TextBox 33">
+            <a:extLst>
+              <a:ext uri="{FF2B5EF4-FFF2-40B4-BE49-F238E27FC236}">
+                <a16:creationId xmlns:a16="http://schemas.microsoft.com/office/drawing/2014/main" id="{CF82B09D-0455-774B-AEBF-2B6CDD0BA95D}"/>
+              </a:ext>
+            </a:extLst>
+          </p:cNvPr>
+          <p:cNvSpPr txBox="1"/>
+          <p:nvPr/>
+        </p:nvSpPr>
+        <p:spPr>
+          <a:xfrm>
+            <a:off x="28186481" y="19858138"/>
+            <a:ext cx="2889676" cy="523220"/>
+          </a:xfrm>
+          <a:prstGeom prst="rect">
+            <a:avLst/>
+          </a:prstGeom>
+          <a:noFill/>
+        </p:spPr>
+        <p:txBody>
+          <a:bodyPr wrap="square" rtlCol="0">
+            <a:spAutoFit/>
+          </a:bodyPr>
+          <a:lstStyle/>
+          <a:p>
+            <a:r>
+              <a:rPr lang="en-US" sz="2800" dirty="0"/>
+              <a:t>3-layer NN 88%</a:t>
+            </a:r>
           </a:p>
         </p:txBody>
       </p:sp>

</xml_diff>